<commit_message>
corrections following perrine comments
</commit_message>
<xml_diff>
--- a/Fig/Intro/Intro_DRF_model/Intro_DRF_model.pptx
+++ b/Fig/Intro/Intro_DRF_model/Intro_DRF_model.pptx
@@ -208,7 +208,7 @@
           <a:p>
             <a:fld id="{C9E36796-3BFE-4867-9ABD-08B4C222DE73}" type="datetimeFigureOut">
               <a:rPr lang="en-US" smtClean="0"/>
-              <a:t>9/19/2017</a:t>
+              <a:t>10/27/2017</a:t>
             </a:fld>
             <a:endParaRPr lang="en-US"/>
           </a:p>
@@ -696,7 +696,7 @@
           <a:p>
             <a:fld id="{FFCA3A82-EC32-4B49-BF0B-8FC2564EDB60}" type="datetimeFigureOut">
               <a:rPr lang="en-US" smtClean="0"/>
-              <a:t>9/19/2017</a:t>
+              <a:t>10/27/2017</a:t>
             </a:fld>
             <a:endParaRPr lang="en-US"/>
           </a:p>
@@ -866,7 +866,7 @@
           <a:p>
             <a:fld id="{FFCA3A82-EC32-4B49-BF0B-8FC2564EDB60}" type="datetimeFigureOut">
               <a:rPr lang="en-US" smtClean="0"/>
-              <a:t>9/19/2017</a:t>
+              <a:t>10/27/2017</a:t>
             </a:fld>
             <a:endParaRPr lang="en-US"/>
           </a:p>
@@ -1046,7 +1046,7 @@
           <a:p>
             <a:fld id="{FFCA3A82-EC32-4B49-BF0B-8FC2564EDB60}" type="datetimeFigureOut">
               <a:rPr lang="en-US" smtClean="0"/>
-              <a:t>9/19/2017</a:t>
+              <a:t>10/27/2017</a:t>
             </a:fld>
             <a:endParaRPr lang="en-US"/>
           </a:p>
@@ -1216,7 +1216,7 @@
           <a:p>
             <a:fld id="{FFCA3A82-EC32-4B49-BF0B-8FC2564EDB60}" type="datetimeFigureOut">
               <a:rPr lang="en-US" smtClean="0"/>
-              <a:t>9/19/2017</a:t>
+              <a:t>10/27/2017</a:t>
             </a:fld>
             <a:endParaRPr lang="en-US"/>
           </a:p>
@@ -1460,7 +1460,7 @@
           <a:p>
             <a:fld id="{FFCA3A82-EC32-4B49-BF0B-8FC2564EDB60}" type="datetimeFigureOut">
               <a:rPr lang="en-US" smtClean="0"/>
-              <a:t>9/19/2017</a:t>
+              <a:t>10/27/2017</a:t>
             </a:fld>
             <a:endParaRPr lang="en-US"/>
           </a:p>
@@ -1692,7 +1692,7 @@
           <a:p>
             <a:fld id="{FFCA3A82-EC32-4B49-BF0B-8FC2564EDB60}" type="datetimeFigureOut">
               <a:rPr lang="en-US" smtClean="0"/>
-              <a:t>9/19/2017</a:t>
+              <a:t>10/27/2017</a:t>
             </a:fld>
             <a:endParaRPr lang="en-US"/>
           </a:p>
@@ -2059,7 +2059,7 @@
           <a:p>
             <a:fld id="{FFCA3A82-EC32-4B49-BF0B-8FC2564EDB60}" type="datetimeFigureOut">
               <a:rPr lang="en-US" smtClean="0"/>
-              <a:t>9/19/2017</a:t>
+              <a:t>10/27/2017</a:t>
             </a:fld>
             <a:endParaRPr lang="en-US"/>
           </a:p>
@@ -2177,7 +2177,7 @@
           <a:p>
             <a:fld id="{FFCA3A82-EC32-4B49-BF0B-8FC2564EDB60}" type="datetimeFigureOut">
               <a:rPr lang="en-US" smtClean="0"/>
-              <a:t>9/19/2017</a:t>
+              <a:t>10/27/2017</a:t>
             </a:fld>
             <a:endParaRPr lang="en-US"/>
           </a:p>
@@ -2272,7 +2272,7 @@
           <a:p>
             <a:fld id="{FFCA3A82-EC32-4B49-BF0B-8FC2564EDB60}" type="datetimeFigureOut">
               <a:rPr lang="en-US" smtClean="0"/>
-              <a:t>9/19/2017</a:t>
+              <a:t>10/27/2017</a:t>
             </a:fld>
             <a:endParaRPr lang="en-US"/>
           </a:p>
@@ -2549,7 +2549,7 @@
           <a:p>
             <a:fld id="{FFCA3A82-EC32-4B49-BF0B-8FC2564EDB60}" type="datetimeFigureOut">
               <a:rPr lang="en-US" smtClean="0"/>
-              <a:t>9/19/2017</a:t>
+              <a:t>10/27/2017</a:t>
             </a:fld>
             <a:endParaRPr lang="en-US"/>
           </a:p>
@@ -2806,7 +2806,7 @@
           <a:p>
             <a:fld id="{FFCA3A82-EC32-4B49-BF0B-8FC2564EDB60}" type="datetimeFigureOut">
               <a:rPr lang="en-US" smtClean="0"/>
-              <a:t>9/19/2017</a:t>
+              <a:t>10/27/2017</a:t>
             </a:fld>
             <a:endParaRPr lang="en-US"/>
           </a:p>
@@ -3019,7 +3019,7 @@
           <a:p>
             <a:fld id="{FFCA3A82-EC32-4B49-BF0B-8FC2564EDB60}" type="datetimeFigureOut">
               <a:rPr lang="en-US" smtClean="0"/>
-              <a:t>9/19/2017</a:t>
+              <a:t>10/27/2017</a:t>
             </a:fld>
             <a:endParaRPr lang="en-US"/>
           </a:p>
@@ -3490,6 +3490,14 @@
           <a:ln>
             <a:noFill/>
           </a:ln>
+          <a:effectLst>
+            <a:outerShdw blurRad="25400" dist="38100" dir="2700000" algn="tl" rotWithShape="0">
+              <a:schemeClr val="bg2">
+                <a:lumMod val="75000"/>
+                <a:alpha val="40000"/>
+              </a:schemeClr>
+            </a:outerShdw>
+          </a:effectLst>
         </p:spPr>
         <p:style>
           <a:lnRef idx="2">
@@ -3531,15 +3539,19 @@
             <a:avLst/>
           </a:prstGeom>
           <a:solidFill>
-            <a:schemeClr val="tx2">
-              <a:lumMod val="50000"/>
-            </a:schemeClr>
+            <a:srgbClr val="222A35"/>
           </a:solidFill>
           <a:ln>
-            <a:solidFill>
-              <a:schemeClr val="bg1"/>
-            </a:solidFill>
+            <a:noFill/>
           </a:ln>
+          <a:effectLst>
+            <a:outerShdw blurRad="25400" dist="38100" dir="2700000" algn="tl" rotWithShape="0">
+              <a:schemeClr val="bg2">
+                <a:lumMod val="50000"/>
+                <a:alpha val="40000"/>
+              </a:schemeClr>
+            </a:outerShdw>
+          </a:effectLst>
         </p:spPr>
         <p:style>
           <a:lnRef idx="2">
@@ -3564,16 +3576,40 @@
             <a:pPr algn="ctr"/>
             <a:r>
               <a:rPr lang="en-US" sz="1600" dirty="0">
+                <a:latin typeface="Open Sans Light" panose="020B0306030504020204" pitchFamily="34" charset="0"/>
+                <a:ea typeface="Open Sans Light" panose="020B0306030504020204" pitchFamily="34" charset="0"/>
+                <a:cs typeface="Open Sans Light" panose="020B0306030504020204" pitchFamily="34" charset="0"/>
+              </a:rPr>
+              <a:t>Dream</a:t>
+            </a:r>
+            <a:r>
+              <a:rPr lang="en-US" sz="1600" dirty="0">
                 <a:latin typeface="Helvetica" pitchFamily="2" charset="0"/>
                 <a:ea typeface="Open Sans" panose="020B0606030504020204" pitchFamily="34" charset="0"/>
                 <a:cs typeface="Open Sans" panose="020B0606030504020204" pitchFamily="34" charset="0"/>
               </a:rPr>
-              <a:t>Dream experience</a:t>
+              <a:t> </a:t>
+            </a:r>
+            <a:r>
+              <a:rPr lang="en-US" sz="1600" dirty="0">
+                <a:latin typeface="Open Sans Semibold" panose="020B0706030804020204" pitchFamily="34" charset="0"/>
+                <a:ea typeface="Open Sans Semibold" panose="020B0706030804020204" pitchFamily="34" charset="0"/>
+                <a:cs typeface="Open Sans Semibold" panose="020B0706030804020204" pitchFamily="34" charset="0"/>
+              </a:rPr>
+              <a:t>E</a:t>
+            </a:r>
+            <a:r>
+              <a:rPr lang="en-US" sz="1600" dirty="0" smtClean="0">
+                <a:latin typeface="Open Sans Semibold" panose="020B0706030804020204" pitchFamily="34" charset="0"/>
+                <a:ea typeface="Open Sans Semibold" panose="020B0706030804020204" pitchFamily="34" charset="0"/>
+                <a:cs typeface="Open Sans Semibold" panose="020B0706030804020204" pitchFamily="34" charset="0"/>
+              </a:rPr>
+              <a:t>xperience</a:t>
             </a:r>
             <a:endParaRPr lang="en-US" sz="1600" dirty="0">
-              <a:latin typeface="Helvetica" pitchFamily="2" charset="0"/>
-              <a:ea typeface="Open Sans" panose="020B0606030504020204" pitchFamily="34" charset="0"/>
-              <a:cs typeface="Open Sans" panose="020B0606030504020204" pitchFamily="34" charset="0"/>
+              <a:latin typeface="Open Sans Semibold" panose="020B0706030804020204" pitchFamily="34" charset="0"/>
+              <a:ea typeface="Open Sans Semibold" panose="020B0706030804020204" pitchFamily="34" charset="0"/>
+              <a:cs typeface="Open Sans Semibold" panose="020B0706030804020204" pitchFamily="34" charset="0"/>
             </a:endParaRPr>
           </a:p>
         </p:txBody>
@@ -3593,14 +3629,19 @@
             <a:avLst/>
           </a:prstGeom>
           <a:solidFill>
-            <a:schemeClr val="tx2">
-              <a:lumMod val="40000"/>
-              <a:lumOff val="60000"/>
-            </a:schemeClr>
+            <a:srgbClr val="9CABC0"/>
           </a:solidFill>
           <a:ln>
             <a:noFill/>
           </a:ln>
+          <a:effectLst>
+            <a:outerShdw blurRad="25400" dist="38100" dir="2700000" algn="tl" rotWithShape="0">
+              <a:schemeClr val="bg2">
+                <a:lumMod val="50000"/>
+                <a:alpha val="40000"/>
+              </a:schemeClr>
+            </a:outerShdw>
+          </a:effectLst>
         </p:spPr>
         <p:style>
           <a:lnRef idx="2">
@@ -3628,19 +3669,41 @@
                 <a:solidFill>
                   <a:schemeClr val="tx1"/>
                 </a:solidFill>
-                <a:latin typeface="Helvetica" pitchFamily="2" charset="0"/>
-                <a:ea typeface="Open Sans" panose="020B0606030504020204" pitchFamily="34" charset="0"/>
-                <a:cs typeface="Open Sans" panose="020B0606030504020204" pitchFamily="34" charset="0"/>
+                <a:latin typeface="Open Sans Light" panose="020B0306030504020204" pitchFamily="34" charset="0"/>
+                <a:ea typeface="Open Sans Light" panose="020B0306030504020204" pitchFamily="34" charset="0"/>
+                <a:cs typeface="Open Sans Light" panose="020B0306030504020204" pitchFamily="34" charset="0"/>
               </a:rPr>
-              <a:t>Dream recall</a:t>
+              <a:t>Dream </a:t>
+            </a:r>
+            <a:r>
+              <a:rPr lang="en-US" sz="1600" dirty="0">
+                <a:solidFill>
+                  <a:schemeClr val="tx1"/>
+                </a:solidFill>
+                <a:latin typeface="Open Sans Semibold" panose="020B0706030804020204" pitchFamily="34" charset="0"/>
+                <a:ea typeface="Open Sans Semibold" panose="020B0706030804020204" pitchFamily="34" charset="0"/>
+                <a:cs typeface="Open Sans Semibold" panose="020B0706030804020204" pitchFamily="34" charset="0"/>
+              </a:rPr>
+              <a:t>R</a:t>
+            </a:r>
+            <a:r>
+              <a:rPr lang="en-US" sz="1600" dirty="0" smtClean="0">
+                <a:solidFill>
+                  <a:schemeClr val="tx1"/>
+                </a:solidFill>
+                <a:latin typeface="Open Sans Semibold" panose="020B0706030804020204" pitchFamily="34" charset="0"/>
+                <a:ea typeface="Open Sans Semibold" panose="020B0706030804020204" pitchFamily="34" charset="0"/>
+                <a:cs typeface="Open Sans Semibold" panose="020B0706030804020204" pitchFamily="34" charset="0"/>
+              </a:rPr>
+              <a:t>ecall</a:t>
             </a:r>
             <a:endParaRPr lang="en-US" sz="1600" dirty="0">
               <a:solidFill>
                 <a:schemeClr val="tx1"/>
               </a:solidFill>
-              <a:latin typeface="Helvetica" pitchFamily="2" charset="0"/>
-              <a:ea typeface="Open Sans" panose="020B0606030504020204" pitchFamily="34" charset="0"/>
-              <a:cs typeface="Open Sans" panose="020B0606030504020204" pitchFamily="34" charset="0"/>
+              <a:latin typeface="Open Sans Semibold" panose="020B0706030804020204" pitchFamily="34" charset="0"/>
+              <a:ea typeface="Open Sans Semibold" panose="020B0706030804020204" pitchFamily="34" charset="0"/>
+              <a:cs typeface="Open Sans Semibold" panose="020B0706030804020204" pitchFamily="34" charset="0"/>
             </a:endParaRPr>
           </a:p>
         </p:txBody>
@@ -3660,6 +3723,7 @@
             <a:avLst/>
           </a:prstGeom>
           <a:noFill/>
+          <a:effectLst/>
         </p:spPr>
         <p:txBody>
           <a:bodyPr wrap="square" rtlCol="0">
@@ -3679,14 +3743,6 @@
               </a:rPr>
               <a:t>Memory encoding</a:t>
             </a:r>
-            <a:endParaRPr lang="en-US" sz="1099" i="1" dirty="0">
-              <a:solidFill>
-                <a:schemeClr val="bg1"/>
-              </a:solidFill>
-              <a:latin typeface="Helvetica" pitchFamily="2" charset="0"/>
-              <a:ea typeface="Open Sans" panose="020B0606030504020204" pitchFamily="34" charset="0"/>
-              <a:cs typeface="Open Sans" panose="020B0606030504020204" pitchFamily="34" charset="0"/>
-            </a:endParaRPr>
           </a:p>
         </p:txBody>
       </p:sp>
@@ -3846,39 +3902,7 @@
                 <a:ea typeface="Open Sans" panose="020B0606030504020204" pitchFamily="34" charset="0"/>
                 <a:cs typeface="Open Sans" panose="020B0606030504020204" pitchFamily="34" charset="0"/>
               </a:rPr>
-              <a:t>Dreams </a:t>
-            </a:r>
-            <a:r>
-              <a:rPr lang="en-US" sz="900" dirty="0">
-                <a:latin typeface="Helvetica" pitchFamily="2" charset="0"/>
-                <a:ea typeface="Open Sans" panose="020B0606030504020204" pitchFamily="34" charset="0"/>
-                <a:cs typeface="Open Sans" panose="020B0606030504020204" pitchFamily="34" charset="0"/>
-              </a:rPr>
-              <a:t>that are not </a:t>
-            </a:r>
-            <a:r>
-              <a:rPr lang="en-US" sz="900" dirty="0">
-                <a:latin typeface="Helvetica" pitchFamily="2" charset="0"/>
-                <a:ea typeface="Open Sans" panose="020B0606030504020204" pitchFamily="34" charset="0"/>
-                <a:cs typeface="Open Sans" panose="020B0606030504020204" pitchFamily="34" charset="0"/>
-              </a:rPr>
-              <a:t>sufficiently disguised to pass the censor will </a:t>
-            </a:r>
-            <a:r>
-              <a:rPr lang="en-US" sz="900" dirty="0">
-                <a:latin typeface="Helvetica" pitchFamily="2" charset="0"/>
-                <a:ea typeface="Open Sans" panose="020B0606030504020204" pitchFamily="34" charset="0"/>
-                <a:cs typeface="Open Sans" panose="020B0606030504020204" pitchFamily="34" charset="0"/>
-              </a:rPr>
-              <a:t>be entirely repressed and therefore </a:t>
-            </a:r>
-            <a:r>
-              <a:rPr lang="en-US" sz="900" dirty="0">
-                <a:latin typeface="Helvetica" pitchFamily="2" charset="0"/>
-                <a:ea typeface="Open Sans" panose="020B0606030504020204" pitchFamily="34" charset="0"/>
-                <a:cs typeface="Open Sans" panose="020B0606030504020204" pitchFamily="34" charset="0"/>
-              </a:rPr>
-              <a:t>forgotten</a:t>
+              <a:t>Dreams that are not sufficiently disguised to pass the censor will be entirely repressed and therefore forgotten</a:t>
             </a:r>
             <a:endParaRPr lang="en-US" sz="900" i="1" dirty="0">
               <a:latin typeface="Helvetica" pitchFamily="2" charset="0"/>
@@ -4051,23 +4075,7 @@
                 <a:ea typeface="Open Sans" panose="020B0606030504020204" pitchFamily="34" charset="0"/>
                 <a:cs typeface="Open Sans" panose="020B0606030504020204" pitchFamily="34" charset="0"/>
               </a:rPr>
-              <a:t>a period of wakefulness occur just </a:t>
-            </a:r>
-            <a:r>
-              <a:rPr lang="en-US" sz="900" dirty="0">
-                <a:latin typeface="Helvetica" pitchFamily="2" charset="0"/>
-                <a:ea typeface="Open Sans" panose="020B0606030504020204" pitchFamily="34" charset="0"/>
-                <a:cs typeface="Open Sans" panose="020B0606030504020204" pitchFamily="34" charset="0"/>
-              </a:rPr>
-              <a:t>after </a:t>
-            </a:r>
-            <a:r>
-              <a:rPr lang="en-US" sz="900" dirty="0">
-                <a:latin typeface="Helvetica" pitchFamily="2" charset="0"/>
-                <a:ea typeface="Open Sans" panose="020B0606030504020204" pitchFamily="34" charset="0"/>
-                <a:cs typeface="Open Sans" panose="020B0606030504020204" pitchFamily="34" charset="0"/>
-              </a:rPr>
-              <a:t>dreaming</a:t>
+              <a:t>a period of wakefulness occur just after dreaming</a:t>
             </a:r>
           </a:p>
           <a:p>
@@ -4171,55 +4179,7 @@
                 <a:ea typeface="Open Sans" panose="020B0606030504020204" pitchFamily="34" charset="0"/>
                 <a:cs typeface="Open Sans" panose="020B0606030504020204" pitchFamily="34" charset="0"/>
               </a:rPr>
-              <a:t>The </a:t>
-            </a:r>
-            <a:r>
-              <a:rPr lang="en-US" sz="900" dirty="0">
-                <a:latin typeface="Helvetica" pitchFamily="2" charset="0"/>
-                <a:ea typeface="Open Sans" panose="020B0606030504020204" pitchFamily="34" charset="0"/>
-                <a:cs typeface="Open Sans" panose="020B0606030504020204" pitchFamily="34" charset="0"/>
-              </a:rPr>
-              <a:t>dream memory trace remains so long </a:t>
-            </a:r>
-            <a:r>
-              <a:rPr lang="en-US" sz="900" dirty="0">
-                <a:latin typeface="Helvetica" pitchFamily="2" charset="0"/>
-                <a:ea typeface="Open Sans" panose="020B0606030504020204" pitchFamily="34" charset="0"/>
-                <a:cs typeface="Open Sans" panose="020B0606030504020204" pitchFamily="34" charset="0"/>
-              </a:rPr>
-              <a:t>as there </a:t>
-            </a:r>
-            <a:r>
-              <a:rPr lang="en-US" sz="900" dirty="0">
-                <a:latin typeface="Helvetica" pitchFamily="2" charset="0"/>
-                <a:ea typeface="Open Sans" panose="020B0606030504020204" pitchFamily="34" charset="0"/>
-                <a:cs typeface="Open Sans" panose="020B0606030504020204" pitchFamily="34" charset="0"/>
-              </a:rPr>
-              <a:t>is </a:t>
-            </a:r>
-            <a:r>
-              <a:rPr lang="en-US" sz="900" dirty="0">
-                <a:latin typeface="Helvetica" pitchFamily="2" charset="0"/>
-                <a:ea typeface="Open Sans" panose="020B0606030504020204" pitchFamily="34" charset="0"/>
-                <a:cs typeface="Open Sans" panose="020B0606030504020204" pitchFamily="34" charset="0"/>
-              </a:rPr>
-              <a:t>interference (i.e. </a:t>
-            </a:r>
-            <a:r>
-              <a:rPr lang="en-US" sz="900" dirty="0">
-                <a:latin typeface="Helvetica" pitchFamily="2" charset="0"/>
-                <a:ea typeface="Open Sans" panose="020B0606030504020204" pitchFamily="34" charset="0"/>
-                <a:cs typeface="Open Sans" panose="020B0606030504020204" pitchFamily="34" charset="0"/>
-              </a:rPr>
-              <a:t>the dreamer must voluntarily pay attention to the dream immediately after awakening</a:t>
-            </a:r>
-            <a:r>
-              <a:rPr lang="en-US" sz="900" dirty="0">
-                <a:latin typeface="Helvetica" pitchFamily="2" charset="0"/>
-                <a:ea typeface="Open Sans" panose="020B0606030504020204" pitchFamily="34" charset="0"/>
-                <a:cs typeface="Open Sans" panose="020B0606030504020204" pitchFamily="34" charset="0"/>
-              </a:rPr>
-              <a:t>)</a:t>
+              <a:t>The dream memory trace remains so long as there is interference (i.e. the dreamer must voluntarily pay attention to the dream immediately after awakening)</a:t>
             </a:r>
           </a:p>
         </p:txBody>
@@ -4297,31 +4257,7 @@
                 <a:ea typeface="Open Sans" panose="020B0606030504020204" pitchFamily="34" charset="0"/>
                 <a:cs typeface="Open Sans" panose="020B0606030504020204" pitchFamily="34" charset="0"/>
               </a:rPr>
-              <a:t>Higher interest in dreams and </a:t>
-            </a:r>
-            <a:r>
-              <a:rPr lang="en-US" sz="900" dirty="0">
-                <a:latin typeface="Helvetica" pitchFamily="2" charset="0"/>
-                <a:ea typeface="Open Sans" panose="020B0606030504020204" pitchFamily="34" charset="0"/>
-                <a:cs typeface="Open Sans" panose="020B0606030504020204" pitchFamily="34" charset="0"/>
-              </a:rPr>
-              <a:t>thinner </a:t>
-            </a:r>
-            <a:r>
-              <a:rPr lang="en-US" sz="900" dirty="0">
-                <a:latin typeface="Helvetica" pitchFamily="2" charset="0"/>
-                <a:ea typeface="Open Sans" panose="020B0606030504020204" pitchFamily="34" charset="0"/>
-                <a:cs typeface="Open Sans" panose="020B0606030504020204" pitchFamily="34" charset="0"/>
-              </a:rPr>
-              <a:t>boundaries result in higher dream </a:t>
-            </a:r>
-            <a:r>
-              <a:rPr lang="en-US" sz="900" dirty="0">
-                <a:latin typeface="Helvetica" pitchFamily="2" charset="0"/>
-                <a:ea typeface="Open Sans" panose="020B0606030504020204" pitchFamily="34" charset="0"/>
-                <a:cs typeface="Open Sans" panose="020B0606030504020204" pitchFamily="34" charset="0"/>
-              </a:rPr>
-              <a:t>recall</a:t>
+              <a:t>Higher interest in dreams and thinner boundaries result in higher dream recall</a:t>
             </a:r>
             <a:endParaRPr lang="en-US" sz="900" i="1" dirty="0">
               <a:latin typeface="Helvetica" pitchFamily="2" charset="0"/>

</xml_diff>